<commit_message>
- Configuration of new Ionic HydrateME application
</commit_message>
<xml_diff>
--- a/icons/iconPPT.pptx
+++ b/icons/iconPPT.pptx
@@ -8,6 +8,7 @@
     <p:sldId id="256" r:id="rId2"/>
     <p:sldId id="257" r:id="rId3"/>
     <p:sldId id="258" r:id="rId4"/>
+    <p:sldId id="259" r:id="rId5"/>
   </p:sldIdLst>
   <p:sldSz cx="12192000" cy="6858000"/>
   <p:notesSz cx="6858000" cy="9144000"/>
@@ -243,7 +244,7 @@
           <a:p>
             <a:fld id="{B0B3E492-A928-4077-A905-FB59C3C1F06A}" type="datetimeFigureOut">
               <a:rPr lang="en-US" smtClean="0"/>
-              <a:t>10/26/2016</a:t>
+              <a:t>10/27/2016</a:t>
             </a:fld>
             <a:endParaRPr lang="en-US"/>
           </a:p>
@@ -411,7 +412,7 @@
           <a:p>
             <a:fld id="{B0B3E492-A928-4077-A905-FB59C3C1F06A}" type="datetimeFigureOut">
               <a:rPr lang="en-US" smtClean="0"/>
-              <a:t>10/26/2016</a:t>
+              <a:t>10/27/2016</a:t>
             </a:fld>
             <a:endParaRPr lang="en-US"/>
           </a:p>
@@ -589,7 +590,7 @@
           <a:p>
             <a:fld id="{B0B3E492-A928-4077-A905-FB59C3C1F06A}" type="datetimeFigureOut">
               <a:rPr lang="en-US" smtClean="0"/>
-              <a:t>10/26/2016</a:t>
+              <a:t>10/27/2016</a:t>
             </a:fld>
             <a:endParaRPr lang="en-US"/>
           </a:p>
@@ -757,7 +758,7 @@
           <a:p>
             <a:fld id="{B0B3E492-A928-4077-A905-FB59C3C1F06A}" type="datetimeFigureOut">
               <a:rPr lang="en-US" smtClean="0"/>
-              <a:t>10/26/2016</a:t>
+              <a:t>10/27/2016</a:t>
             </a:fld>
             <a:endParaRPr lang="en-US"/>
           </a:p>
@@ -1002,7 +1003,7 @@
           <a:p>
             <a:fld id="{B0B3E492-A928-4077-A905-FB59C3C1F06A}" type="datetimeFigureOut">
               <a:rPr lang="en-US" smtClean="0"/>
-              <a:t>10/26/2016</a:t>
+              <a:t>10/27/2016</a:t>
             </a:fld>
             <a:endParaRPr lang="en-US"/>
           </a:p>
@@ -1231,7 +1232,7 @@
           <a:p>
             <a:fld id="{B0B3E492-A928-4077-A905-FB59C3C1F06A}" type="datetimeFigureOut">
               <a:rPr lang="en-US" smtClean="0"/>
-              <a:t>10/26/2016</a:t>
+              <a:t>10/27/2016</a:t>
             </a:fld>
             <a:endParaRPr lang="en-US"/>
           </a:p>
@@ -1595,7 +1596,7 @@
           <a:p>
             <a:fld id="{B0B3E492-A928-4077-A905-FB59C3C1F06A}" type="datetimeFigureOut">
               <a:rPr lang="en-US" smtClean="0"/>
-              <a:t>10/26/2016</a:t>
+              <a:t>10/27/2016</a:t>
             </a:fld>
             <a:endParaRPr lang="en-US"/>
           </a:p>
@@ -1712,7 +1713,7 @@
           <a:p>
             <a:fld id="{B0B3E492-A928-4077-A905-FB59C3C1F06A}" type="datetimeFigureOut">
               <a:rPr lang="en-US" smtClean="0"/>
-              <a:t>10/26/2016</a:t>
+              <a:t>10/27/2016</a:t>
             </a:fld>
             <a:endParaRPr lang="en-US"/>
           </a:p>
@@ -1807,7 +1808,7 @@
           <a:p>
             <a:fld id="{B0B3E492-A928-4077-A905-FB59C3C1F06A}" type="datetimeFigureOut">
               <a:rPr lang="en-US" smtClean="0"/>
-              <a:t>10/26/2016</a:t>
+              <a:t>10/27/2016</a:t>
             </a:fld>
             <a:endParaRPr lang="en-US"/>
           </a:p>
@@ -2082,7 +2083,7 @@
           <a:p>
             <a:fld id="{B0B3E492-A928-4077-A905-FB59C3C1F06A}" type="datetimeFigureOut">
               <a:rPr lang="en-US" smtClean="0"/>
-              <a:t>10/26/2016</a:t>
+              <a:t>10/27/2016</a:t>
             </a:fld>
             <a:endParaRPr lang="en-US"/>
           </a:p>
@@ -2334,7 +2335,7 @@
           <a:p>
             <a:fld id="{B0B3E492-A928-4077-A905-FB59C3C1F06A}" type="datetimeFigureOut">
               <a:rPr lang="en-US" smtClean="0"/>
-              <a:t>10/26/2016</a:t>
+              <a:t>10/27/2016</a:t>
             </a:fld>
             <a:endParaRPr lang="en-US"/>
           </a:p>
@@ -2545,7 +2546,7 @@
           <a:p>
             <a:fld id="{B0B3E492-A928-4077-A905-FB59C3C1F06A}" type="datetimeFigureOut">
               <a:rPr lang="en-US" smtClean="0"/>
-              <a:t>10/26/2016</a:t>
+              <a:t>10/27/2016</a:t>
             </a:fld>
             <a:endParaRPr lang="en-US"/>
           </a:p>
@@ -3230,6 +3231,105 @@
 </p:sld>
 </file>
 
+<file path=ppt/slides/slide4.xml><?xml version="1.0" encoding="utf-8"?>
+<p:sld xmlns:a="http://schemas.openxmlformats.org/drawingml/2006/main" xmlns:r="http://schemas.openxmlformats.org/officeDocument/2006/relationships" xmlns:p="http://schemas.openxmlformats.org/presentationml/2006/main">
+  <p:cSld>
+    <p:spTree>
+      <p:nvGrpSpPr>
+        <p:cNvPr id="1" name=""/>
+        <p:cNvGrpSpPr/>
+        <p:nvPr/>
+      </p:nvGrpSpPr>
+      <p:grpSpPr>
+        <a:xfrm>
+          <a:off x="0" y="0"/>
+          <a:ext cx="0" cy="0"/>
+          <a:chOff x="0" y="0"/>
+          <a:chExt cx="0" cy="0"/>
+        </a:xfrm>
+      </p:grpSpPr>
+      <p:grpSp>
+        <p:nvGrpSpPr>
+          <p:cNvPr id="3" name="Group 2"/>
+          <p:cNvGrpSpPr/>
+          <p:nvPr/>
+        </p:nvGrpSpPr>
+        <p:grpSpPr>
+          <a:xfrm>
+            <a:off x="3657600" y="990600"/>
+            <a:ext cx="4876800" cy="4876800"/>
+            <a:chOff x="3657600" y="990600"/>
+            <a:chExt cx="4876800" cy="4876800"/>
+          </a:xfrm>
+        </p:grpSpPr>
+        <p:pic>
+          <p:nvPicPr>
+            <p:cNvPr id="4" name="Picture 3"/>
+            <p:cNvPicPr>
+              <a:picLocks noChangeAspect="1"/>
+            </p:cNvPicPr>
+            <p:nvPr/>
+          </p:nvPicPr>
+          <p:blipFill>
+            <a:blip r:embed="rId2"/>
+            <a:stretch>
+              <a:fillRect/>
+            </a:stretch>
+          </p:blipFill>
+          <p:spPr>
+            <a:xfrm>
+              <a:off x="3657600" y="990600"/>
+              <a:ext cx="4876800" cy="4876800"/>
+            </a:xfrm>
+            <a:prstGeom prst="rect">
+              <a:avLst/>
+            </a:prstGeom>
+          </p:spPr>
+        </p:pic>
+        <p:pic>
+          <p:nvPicPr>
+            <p:cNvPr id="2" name="Picture 1"/>
+            <p:cNvPicPr>
+              <a:picLocks noChangeAspect="1"/>
+            </p:cNvPicPr>
+            <p:nvPr/>
+          </p:nvPicPr>
+          <p:blipFill>
+            <a:blip r:embed="rId3">
+              <a:extLst>
+                <a:ext uri="{28A0092B-C50C-407E-A947-70E740481C1C}">
+                  <a14:useLocalDpi xmlns:a14="http://schemas.microsoft.com/office/drawing/2010/main" val="0"/>
+                </a:ext>
+              </a:extLst>
+            </a:blip>
+            <a:stretch>
+              <a:fillRect/>
+            </a:stretch>
+          </p:blipFill>
+          <p:spPr>
+            <a:xfrm>
+              <a:off x="4681738" y="1842760"/>
+              <a:ext cx="2828524" cy="3172479"/>
+            </a:xfrm>
+            <a:prstGeom prst="rect">
+              <a:avLst/>
+            </a:prstGeom>
+          </p:spPr>
+        </p:pic>
+      </p:grpSp>
+    </p:spTree>
+    <p:extLst>
+      <p:ext uri="{BB962C8B-B14F-4D97-AF65-F5344CB8AC3E}">
+        <p14:creationId xmlns:p14="http://schemas.microsoft.com/office/powerpoint/2010/main" val="926032510"/>
+      </p:ext>
+    </p:extLst>
+  </p:cSld>
+  <p:clrMapOvr>
+    <a:masterClrMapping/>
+  </p:clrMapOvr>
+</p:sld>
+</file>
+
 <file path=ppt/theme/theme1.xml><?xml version="1.0" encoding="utf-8"?>
 <a:theme xmlns:a="http://schemas.openxmlformats.org/drawingml/2006/main" name="Office Theme">
   <a:themeElements>

</xml_diff>